<commit_message>
update ppt & pptcon
</commit_message>
<xml_diff>
--- a/docs/数据结构.pptx
+++ b/docs/数据结构.pptx
@@ -4015,7 +4015,6 @@
             </a:pPr>
             <a:r>
               <a:rPr lang="en-US" sz="5400" b="0" strike="noStrike" spc="-1">
-                <a:ln/>
                 <a:solidFill>
                   <a:schemeClr val="tx1"/>
                 </a:solidFill>
@@ -4026,7 +4025,6 @@
               <a:t>我们做了什么</a:t>
             </a:r>
             <a:endParaRPr lang="en-US" sz="5400" b="0" strike="noStrike" spc="-1">
-              <a:ln/>
               <a:solidFill>
                 <a:schemeClr val="tx1"/>
               </a:solidFill>
@@ -8751,9 +8749,39 @@
                 <a:latin typeface="微软雅黑 Light" panose="020B0502040204020203" charset="-122"/>
                 <a:ea typeface="微软雅黑 Light" panose="020B0502040204020203" charset="-122"/>
               </a:rPr>
-              <a:t>因此，中文词语分析是中文信息处理的基础与关键</a:t>
-            </a:r>
-            <a:endParaRPr lang="en-US" sz="2400" b="0" strike="noStrike" spc="-1">
+              <a:t>因此，中文词语分析是中文信息处理的</a:t>
+            </a:r>
+            <a:r>
+              <a:rPr lang="en-US" sz="2400" b="1" strike="noStrike" spc="-1">
+                <a:solidFill>
+                  <a:srgbClr val="000000"/>
+                </a:solidFill>
+                <a:latin typeface="微软雅黑 Light" panose="020B0502040204020203" charset="-122"/>
+                <a:ea typeface="微软雅黑 Light" panose="020B0502040204020203" charset="-122"/>
+              </a:rPr>
+              <a:t>基础</a:t>
+            </a:r>
+            <a:r>
+              <a:rPr lang="en-US" sz="2400" b="0" strike="noStrike" spc="-1">
+                <a:solidFill>
+                  <a:srgbClr val="000000"/>
+                </a:solidFill>
+                <a:latin typeface="微软雅黑 Light" panose="020B0502040204020203" charset="-122"/>
+                <a:ea typeface="微软雅黑 Light" panose="020B0502040204020203" charset="-122"/>
+              </a:rPr>
+              <a:t>与</a:t>
+            </a:r>
+            <a:r>
+              <a:rPr lang="en-US" sz="2400" b="1" strike="noStrike" spc="-1">
+                <a:solidFill>
+                  <a:srgbClr val="000000"/>
+                </a:solidFill>
+                <a:latin typeface="微软雅黑 Light" panose="020B0502040204020203" charset="-122"/>
+                <a:ea typeface="微软雅黑 Light" panose="020B0502040204020203" charset="-122"/>
+              </a:rPr>
+              <a:t>关键</a:t>
+            </a:r>
+            <a:endParaRPr lang="en-US" sz="2400" b="1" strike="noStrike" spc="-1">
               <a:latin typeface="Arial" panose="020B0604020202020204"/>
             </a:endParaRPr>
           </a:p>
@@ -9432,7 +9460,7 @@
         <p:spPr>
           <a:xfrm>
             <a:off x="1380750" y="2698295"/>
-            <a:ext cx="9430200" cy="1461960"/>
+            <a:ext cx="9430200" cy="1473835"/>
           </a:xfrm>
           <a:prstGeom prst="rect">
             <a:avLst/>
@@ -9472,7 +9500,27 @@
                 <a:latin typeface="微软雅黑 Light" panose="020B0502040204020203" charset="-122"/>
                 <a:ea typeface="微软雅黑 Light" panose="020B0502040204020203" charset="-122"/>
               </a:rPr>
-              <a:t>1. 根据词频字典找出字符串中存在的所有可能词语, 记录其位置以及长度</a:t>
+              <a:t>1. 根据词频字典找出</a:t>
+            </a:r>
+            <a:r>
+              <a:rPr lang="zh-CN" altLang="en-US" sz="2000" b="0" strike="noStrike" spc="-1">
+                <a:solidFill>
+                  <a:srgbClr val="000000"/>
+                </a:solidFill>
+                <a:latin typeface="微软雅黑 Light" panose="020B0502040204020203" charset="-122"/>
+                <a:ea typeface="微软雅黑 Light" panose="020B0502040204020203" charset="-122"/>
+              </a:rPr>
+              <a:t>字符序列</a:t>
+            </a:r>
+            <a:r>
+              <a:rPr lang="en-US" sz="2000" b="0" strike="noStrike" spc="-1">
+                <a:solidFill>
+                  <a:srgbClr val="000000"/>
+                </a:solidFill>
+                <a:latin typeface="微软雅黑 Light" panose="020B0502040204020203" charset="-122"/>
+                <a:ea typeface="微软雅黑 Light" panose="020B0502040204020203" charset="-122"/>
+              </a:rPr>
+              <a:t>中存在的所有可能词语, 记录其位置以及长度</a:t>
             </a:r>
             <a:endParaRPr lang="en-US" sz="2000" b="0" strike="noStrike" spc="-1">
               <a:latin typeface="Arial" panose="020B0604020202020204"/>
@@ -9492,10 +9540,24 @@
                 <a:latin typeface="微软雅黑 Light" panose="020B0502040204020203" charset="-122"/>
                 <a:ea typeface="微软雅黑 Light" panose="020B0502040204020203" charset="-122"/>
               </a:rPr>
-              <a:t>2. 遍历词语的组合, 每个组合要消除歧义, 即不存在冲突区间</a:t>
-            </a:r>
-            <a:endParaRPr lang="en-US" sz="2000" b="0" strike="noStrike" spc="-1">
-              <a:latin typeface="Arial" panose="020B0604020202020204"/>
+              <a:t>2. </a:t>
+            </a:r>
+            <a:r>
+              <a:rPr sz="2000" b="0" strike="noStrike" spc="-1">
+                <a:solidFill>
+                  <a:srgbClr val="000000"/>
+                </a:solidFill>
+                <a:latin typeface="微软雅黑 Light" panose="020B0502040204020203" charset="-122"/>
+                <a:ea typeface="微软雅黑 Light" panose="020B0502040204020203" charset="-122"/>
+              </a:rPr>
+              <a:t>遍历词语的组合，并且每个组合中不存在冲突区间，填充上单个字</a:t>
+            </a:r>
+            <a:endParaRPr sz="2000" b="0" strike="noStrike" spc="-1">
+              <a:solidFill>
+                <a:srgbClr val="000000"/>
+              </a:solidFill>
+              <a:latin typeface="微软雅黑 Light" panose="020B0502040204020203" charset="-122"/>
+              <a:ea typeface="微软雅黑 Light" panose="020B0502040204020203" charset="-122"/>
             </a:endParaRPr>
           </a:p>
           <a:p>
@@ -9655,7 +9717,7 @@
                 <a:latin typeface="微软雅黑 Light" panose="020B0502040204020203" charset="-122"/>
                 <a:ea typeface="微软雅黑 Light" panose="020B0502040204020203" charset="-122"/>
               </a:rPr>
-              <a:t>中文语句</a:t>
+              <a:t>字符序列</a:t>
             </a:r>
             <a:endParaRPr lang="zh-CN" altLang="en-US">
               <a:latin typeface="微软雅黑 Light" panose="020B0502040204020203" charset="-122"/>
@@ -9813,8 +9875,8 @@
         </p:nvSpPr>
         <p:spPr>
           <a:xfrm>
-            <a:off x="9271635" y="1533525"/>
-            <a:ext cx="1440180" cy="664845"/>
+            <a:off x="8914765" y="1343660"/>
+            <a:ext cx="2167890" cy="854710"/>
           </a:xfrm>
           <a:prstGeom prst="flowChartProcess">
             <a:avLst/>
@@ -9843,7 +9905,7 @@
                 <a:latin typeface="微软雅黑 Light" panose="020B0502040204020203" charset="-122"/>
                 <a:ea typeface="微软雅黑 Light" panose="020B0502040204020203" charset="-122"/>
               </a:rPr>
-              <a:t>计算该组合信息量</a:t>
+              <a:t>填充单字，计算该组合信息量</a:t>
             </a:r>
             <a:endParaRPr lang="zh-CN" altLang="en-US">
               <a:latin typeface="微软雅黑 Light" panose="020B0502040204020203" charset="-122"/>
@@ -10188,14 +10250,14 @@
         </p:nvCxnSpPr>
         <p:spPr>
           <a:xfrm rot="5400000" flipH="1" flipV="1">
-            <a:off x="5787708" y="2114233"/>
-            <a:ext cx="4784725" cy="3623310"/>
+            <a:off x="5696268" y="2015808"/>
+            <a:ext cx="4974590" cy="3630295"/>
           </a:xfrm>
           <a:prstGeom prst="bentConnector5">
             <a:avLst>
-              <a:gd name="adj1" fmla="val -8148"/>
-              <a:gd name="adj2" fmla="val 150385"/>
-              <a:gd name="adj3" fmla="val 104983"/>
+              <a:gd name="adj1" fmla="val -4780"/>
+              <a:gd name="adj2" fmla="val 150673"/>
+              <a:gd name="adj3" fmla="val 104793"/>
             </a:avLst>
           </a:prstGeom>
           <a:ln>
@@ -10227,9 +10289,9 @@
           <p:nvPr/>
         </p:nvCxnSpPr>
         <p:spPr>
-          <a:xfrm>
-            <a:off x="9991725" y="2198370"/>
-            <a:ext cx="635" cy="346710"/>
+          <a:xfrm flipH="1">
+            <a:off x="9992360" y="2198370"/>
+            <a:ext cx="6350" cy="346710"/>
           </a:xfrm>
           <a:prstGeom prst="straightConnector1">
             <a:avLst/>

</xml_diff>